<commit_message>
Updated Slides to fix small errors
</commit_message>
<xml_diff>
--- a/IntroCyberSecurity/Module 1 Introduction/Lesson_1_Course_Overview.pptx
+++ b/IntroCyberSecurity/Module 1 Introduction/Lesson_1_Course_Overview.pptx
@@ -5,38 +5,39 @@
     <p:sldMasterId id="2147483686" r:id="rId1"/>
   </p:sldMasterIdLst>
   <p:notesMasterIdLst>
-    <p:notesMasterId r:id="rId23"/>
+    <p:notesMasterId r:id="rId24"/>
   </p:notesMasterIdLst>
   <p:handoutMasterIdLst>
-    <p:handoutMasterId r:id="rId24"/>
+    <p:handoutMasterId r:id="rId25"/>
   </p:handoutMasterIdLst>
   <p:sldIdLst>
     <p:sldId id="340" r:id="rId2"/>
     <p:sldId id="343" r:id="rId3"/>
     <p:sldId id="362" r:id="rId4"/>
     <p:sldId id="342" r:id="rId5"/>
-    <p:sldId id="363" r:id="rId6"/>
-    <p:sldId id="364" r:id="rId7"/>
-    <p:sldId id="368" r:id="rId8"/>
-    <p:sldId id="350" r:id="rId9"/>
-    <p:sldId id="351" r:id="rId10"/>
-    <p:sldId id="369" r:id="rId11"/>
-    <p:sldId id="355" r:id="rId12"/>
-    <p:sldId id="353" r:id="rId13"/>
-    <p:sldId id="370" r:id="rId14"/>
-    <p:sldId id="366" r:id="rId15"/>
-    <p:sldId id="359" r:id="rId16"/>
-    <p:sldId id="372" r:id="rId17"/>
-    <p:sldId id="360" r:id="rId18"/>
-    <p:sldId id="361" r:id="rId19"/>
-    <p:sldId id="371" r:id="rId20"/>
-    <p:sldId id="373" r:id="rId21"/>
-    <p:sldId id="333" r:id="rId22"/>
+    <p:sldId id="374" r:id="rId6"/>
+    <p:sldId id="363" r:id="rId7"/>
+    <p:sldId id="364" r:id="rId8"/>
+    <p:sldId id="368" r:id="rId9"/>
+    <p:sldId id="350" r:id="rId10"/>
+    <p:sldId id="351" r:id="rId11"/>
+    <p:sldId id="369" r:id="rId12"/>
+    <p:sldId id="355" r:id="rId13"/>
+    <p:sldId id="353" r:id="rId14"/>
+    <p:sldId id="370" r:id="rId15"/>
+    <p:sldId id="366" r:id="rId16"/>
+    <p:sldId id="359" r:id="rId17"/>
+    <p:sldId id="372" r:id="rId18"/>
+    <p:sldId id="360" r:id="rId19"/>
+    <p:sldId id="361" r:id="rId20"/>
+    <p:sldId id="371" r:id="rId21"/>
+    <p:sldId id="373" r:id="rId22"/>
+    <p:sldId id="333" r:id="rId23"/>
   </p:sldIdLst>
   <p:sldSz cx="9144000" cy="6858000" type="screen4x3"/>
   <p:notesSz cx="7315200" cy="9601200"/>
   <p:custDataLst>
-    <p:tags r:id="rId25"/>
+    <p:tags r:id="rId26"/>
   </p:custDataLst>
   <p:defaultTextStyle>
     <a:defPPr>
@@ -268,7 +269,7 @@
           <a:p>
             <a:fld id="{BABDFB80-8275-3F45-A232-893B69A64C36}" type="datetimeFigureOut">
               <a:rPr lang="en-US" smtClean="0"/>
-              <a:t>4/1/18</a:t>
+              <a:t>4/3/18</a:t>
             </a:fld>
             <a:endParaRPr lang="en-US"/>
           </a:p>
@@ -461,7 +462,7 @@
               <a:pPr>
                 <a:defRPr/>
               </a:pPr>
-              <a:t>4/1/18</a:t>
+              <a:t>4/3/18</a:t>
             </a:fld>
             <a:endParaRPr lang="en-US"/>
           </a:p>
@@ -2919,7 +2920,7 @@
           <p:cNvPr id="3" name="Slide Number Placeholder 2">
             <a:extLst>
               <a:ext uri="{FF2B5EF4-FFF2-40B4-BE49-F238E27FC236}">
-                <a16:creationId xmlns="" xmlns:a16="http://schemas.microsoft.com/office/drawing/2014/main" id="{7D2FFADE-E1BC-48C1-83AA-6DDDD39A33C4}"/>
+                <a16:creationId xmlns:a16="http://schemas.microsoft.com/office/drawing/2014/main" xmlns="" id="{7D2FFADE-E1BC-48C1-83AA-6DDDD39A33C4}"/>
               </a:ext>
             </a:extLst>
           </p:cNvPr>
@@ -2954,7 +2955,7 @@
           <p:cNvPr id="9" name="Picture 8">
             <a:extLst>
               <a:ext uri="{FF2B5EF4-FFF2-40B4-BE49-F238E27FC236}">
-                <a16:creationId xmlns="" xmlns:a16="http://schemas.microsoft.com/office/drawing/2014/main" id="{9CBFC76A-A606-42CF-BCDF-C73975C150B9}"/>
+                <a16:creationId xmlns:a16="http://schemas.microsoft.com/office/drawing/2014/main" xmlns="" id="{9CBFC76A-A606-42CF-BCDF-C73975C150B9}"/>
               </a:ext>
             </a:extLst>
           </p:cNvPr>
@@ -2984,7 +2985,7 @@
           <p:cNvPr id="2" name="Title 1">
             <a:extLst>
               <a:ext uri="{FF2B5EF4-FFF2-40B4-BE49-F238E27FC236}">
-                <a16:creationId xmlns="" xmlns:a16="http://schemas.microsoft.com/office/drawing/2014/main" id="{5C287DE2-E1A2-4F41-96FE-94AF4425CB03}"/>
+                <a16:creationId xmlns:a16="http://schemas.microsoft.com/office/drawing/2014/main" xmlns="" id="{5C287DE2-E1A2-4F41-96FE-94AF4425CB03}"/>
               </a:ext>
             </a:extLst>
           </p:cNvPr>
@@ -4049,7 +4050,7 @@
           <p:cNvPr id="2" name="Title 1">
             <a:extLst>
               <a:ext uri="{FF2B5EF4-FFF2-40B4-BE49-F238E27FC236}">
-                <a16:creationId xmlns="" xmlns:a16="http://schemas.microsoft.com/office/drawing/2014/main" id="{6EB309E1-B997-4458-AE28-FCADE36405DE}"/>
+                <a16:creationId xmlns:a16="http://schemas.microsoft.com/office/drawing/2014/main" xmlns="" id="{6EB309E1-B997-4458-AE28-FCADE36405DE}"/>
               </a:ext>
             </a:extLst>
           </p:cNvPr>
@@ -4090,7 +4091,7 @@
           <p:cNvPr id="3" name="Subtitle 2">
             <a:extLst>
               <a:ext uri="{FF2B5EF4-FFF2-40B4-BE49-F238E27FC236}">
-                <a16:creationId xmlns="" xmlns:a16="http://schemas.microsoft.com/office/drawing/2014/main" id="{6E3BDCF0-5416-4AF1-BF2C-3F3EE2810088}"/>
+                <a16:creationId xmlns:a16="http://schemas.microsoft.com/office/drawing/2014/main" xmlns="" id="{6E3BDCF0-5416-4AF1-BF2C-3F3EE2810088}"/>
               </a:ext>
             </a:extLst>
           </p:cNvPr>
@@ -4157,7 +4158,7 @@
           <p:cNvPr id="2" name="Title 1">
             <a:extLst>
               <a:ext uri="{FF2B5EF4-FFF2-40B4-BE49-F238E27FC236}">
-                <a16:creationId xmlns="" xmlns:a16="http://schemas.microsoft.com/office/drawing/2014/main" id="{C7041EED-8CB5-4D49-8946-45839D580999}"/>
+                <a16:creationId xmlns:a16="http://schemas.microsoft.com/office/drawing/2014/main" xmlns="" id="{C7041EED-8CB5-4D49-8946-45839D580999}"/>
               </a:ext>
             </a:extLst>
           </p:cNvPr>
@@ -4174,9 +4175,10 @@
           <a:lstStyle/>
           <a:p>
             <a:r>
-              <a:rPr lang="en-US" dirty="0"/>
-              <a:t>Values of Assets</a:t>
-            </a:r>
+              <a:rPr lang="en-US" smtClean="0"/>
+              <a:t>Assets of Information systems</a:t>
+            </a:r>
+            <a:endParaRPr lang="en-US" dirty="0"/>
           </a:p>
         </p:txBody>
       </p:sp>
@@ -4208,17 +4210,12 @@
           <a:p>
             <a:r>
               <a:rPr lang="en-US" dirty="0" smtClean="0"/>
-              <a:t>Hardware: </a:t>
-            </a:r>
-            <a:r>
-              <a:rPr lang="en-US" dirty="0"/>
-              <a:t>Less value, can be replaced </a:t>
-            </a:r>
-            <a:r>
-              <a:rPr lang="en-US" dirty="0" smtClean="0"/>
-              <a:t>easily</a:t>
-            </a:r>
-            <a:endParaRPr lang="en-US" dirty="0"/>
+              <a:t>Hardware</a:t>
+            </a:r>
+            <a:r>
+              <a:rPr lang="en-US" dirty="0"/>
+              <a:t>:</a:t>
+            </a:r>
           </a:p>
           <a:p>
             <a:pPr lvl="1"/>
@@ -4235,29 +4232,8 @@
           <a:p>
             <a:r>
               <a:rPr lang="en-US" dirty="0"/>
-              <a:t>Software</a:t>
-            </a:r>
-            <a:r>
-              <a:rPr lang="en-US" dirty="0" smtClean="0"/>
-              <a:t>: </a:t>
-            </a:r>
-            <a:r>
-              <a:rPr lang="en-US" dirty="0"/>
-              <a:t>Less </a:t>
-            </a:r>
-            <a:r>
-              <a:rPr lang="en-US" dirty="0" smtClean="0"/>
-              <a:t>value, can </a:t>
-            </a:r>
-            <a:r>
-              <a:rPr lang="en-US" dirty="0"/>
-              <a:t>be reinstalled if </a:t>
-            </a:r>
-            <a:r>
-              <a:rPr lang="en-US" dirty="0" smtClean="0"/>
-              <a:t>needed</a:t>
-            </a:r>
-            <a:endParaRPr lang="en-US" dirty="0"/>
+              <a:t>Software:</a:t>
+            </a:r>
           </a:p>
           <a:p>
             <a:pPr lvl="1"/>
@@ -4278,15 +4254,7 @@
           <a:p>
             <a:r>
               <a:rPr lang="en-US" dirty="0"/>
-              <a:t>Data</a:t>
-            </a:r>
-            <a:r>
-              <a:rPr lang="en-US" dirty="0" smtClean="0"/>
-              <a:t>: </a:t>
-            </a:r>
-            <a:r>
-              <a:rPr lang="en-US" dirty="0"/>
-              <a:t>Personal data has more value </a:t>
+              <a:t>Data:</a:t>
             </a:r>
           </a:p>
           <a:p>
@@ -4312,7 +4280,7 @@
     </p:spTree>
     <p:extLst>
       <p:ext uri="{BB962C8B-B14F-4D97-AF65-F5344CB8AC3E}">
-        <p14:creationId xmlns:p14="http://schemas.microsoft.com/office/powerpoint/2010/main" val="90903367"/>
+        <p14:creationId xmlns:p14="http://schemas.microsoft.com/office/powerpoint/2010/main" val="1499189681"/>
       </p:ext>
     </p:extLst>
   </p:cSld>
@@ -4341,7 +4309,13 @@
       </p:grpSpPr>
       <p:sp>
         <p:nvSpPr>
-          <p:cNvPr id="2" name="Title 1"/>
+          <p:cNvPr id="2" name="Title 1">
+            <a:extLst>
+              <a:ext uri="{FF2B5EF4-FFF2-40B4-BE49-F238E27FC236}">
+                <a16:creationId xmlns:a16="http://schemas.microsoft.com/office/drawing/2014/main" xmlns="" id="{C7041EED-8CB5-4D49-8946-45839D580999}"/>
+              </a:ext>
+            </a:extLst>
+          </p:cNvPr>
           <p:cNvSpPr>
             <a:spLocks noGrp="1"/>
           </p:cNvSpPr>
@@ -4355,16 +4329,15 @@
           <a:lstStyle/>
           <a:p>
             <a:r>
-              <a:rPr lang="en-US" smtClean="0"/>
-              <a:t>C-I-A triad</a:t>
-            </a:r>
-            <a:endParaRPr lang="en-US" dirty="0"/>
-          </a:p>
-        </p:txBody>
-      </p:sp>
-      <p:sp>
-        <p:nvSpPr>
-          <p:cNvPr id="3" name="Content Placeholder 2"/>
+              <a:rPr lang="en-US" dirty="0"/>
+              <a:t>Values of Assets</a:t>
+            </a:r>
+          </a:p>
+        </p:txBody>
+      </p:sp>
+      <p:sp>
+        <p:nvSpPr>
+          <p:cNvPr id="8" name="Content Placeholder 7"/>
           <p:cNvSpPr>
             <a:spLocks noGrp="1"/>
           </p:cNvSpPr>
@@ -4372,42 +4345,121 @@
             <p:ph idx="1"/>
           </p:nvPr>
         </p:nvSpPr>
-        <p:spPr/>
+        <p:spPr>
+          <a:xfrm>
+            <a:off x="628650" y="1377863"/>
+            <a:ext cx="7587095" cy="4799100"/>
+          </a:xfrm>
+        </p:spPr>
         <p:txBody>
           <a:bodyPr/>
           <a:lstStyle/>
           <a:p>
             <a:r>
               <a:rPr lang="en-US" dirty="0" smtClean="0"/>
-              <a:t>Security Goals:</a:t>
-            </a:r>
+              <a:t>Information system:</a:t>
+            </a:r>
+          </a:p>
+          <a:p>
+            <a:r>
+              <a:rPr lang="en-US" dirty="0" smtClean="0"/>
+              <a:t>Hardware: </a:t>
+            </a:r>
+            <a:r>
+              <a:rPr lang="en-US" dirty="0"/>
+              <a:t>Less value, can be replaced </a:t>
+            </a:r>
+            <a:r>
+              <a:rPr lang="en-US" dirty="0" smtClean="0"/>
+              <a:t>easily</a:t>
+            </a:r>
+            <a:endParaRPr lang="en-US" dirty="0"/>
           </a:p>
           <a:p>
             <a:pPr lvl="1"/>
             <a:r>
               <a:rPr lang="en-US" dirty="0" smtClean="0"/>
-              <a:t>Availability: ensuring timely and reliable access to and use of information. </a:t>
-            </a:r>
+              <a:t>Computer, Network gear, Hard drives, Memory, CDROM</a:t>
+            </a:r>
+            <a:r>
+              <a:rPr lang="mr-IN" dirty="0" smtClean="0"/>
+              <a:t>…</a:t>
+            </a:r>
+            <a:endParaRPr lang="en-US" dirty="0"/>
+          </a:p>
+          <a:p>
+            <a:r>
+              <a:rPr lang="en-US" dirty="0"/>
+              <a:t>Software</a:t>
+            </a:r>
+            <a:r>
+              <a:rPr lang="en-US" dirty="0" smtClean="0"/>
+              <a:t>: </a:t>
+            </a:r>
+            <a:r>
+              <a:rPr lang="en-US" dirty="0"/>
+              <a:t>Less </a:t>
+            </a:r>
+            <a:r>
+              <a:rPr lang="en-US" dirty="0" smtClean="0"/>
+              <a:t>value, can </a:t>
+            </a:r>
+            <a:r>
+              <a:rPr lang="en-US" dirty="0"/>
+              <a:t>be reinstalled if </a:t>
+            </a:r>
+            <a:r>
+              <a:rPr lang="en-US" dirty="0" smtClean="0"/>
+              <a:t>needed</a:t>
+            </a:r>
+            <a:endParaRPr lang="en-US" dirty="0"/>
           </a:p>
           <a:p>
             <a:pPr lvl="1"/>
             <a:r>
+              <a:rPr lang="en-US" dirty="0"/>
+              <a:t>Operating </a:t>
+            </a:r>
+            <a:r>
               <a:rPr lang="en-US" dirty="0" smtClean="0"/>
-              <a:t>Integrity: guarding against improper information modification or destruction, and includes ensuring information non-repudiation and authenticity. </a:t>
+              <a:t>system, Web browser, Text editor, Music player, pdf reader</a:t>
+            </a:r>
+            <a:r>
+              <a:rPr lang="mr-IN" dirty="0" smtClean="0"/>
+              <a:t>…</a:t>
+            </a:r>
+            <a:endParaRPr lang="en-US" dirty="0" smtClean="0"/>
+          </a:p>
+          <a:p>
+            <a:r>
+              <a:rPr lang="en-US" dirty="0"/>
+              <a:t>Data</a:t>
+            </a:r>
+            <a:r>
+              <a:rPr lang="en-US" dirty="0" smtClean="0"/>
+              <a:t>: </a:t>
+            </a:r>
+            <a:r>
+              <a:rPr lang="en-US" dirty="0"/>
+              <a:t>Personal data has more value </a:t>
             </a:r>
           </a:p>
           <a:p>
             <a:pPr lvl="1"/>
             <a:r>
               <a:rPr lang="en-US" dirty="0" smtClean="0"/>
-              <a:t>Confidentiality: Preserving authorized restrictions on information access and disclosure, including means for protecting personal privacy and proprietary information. </a:t>
-            </a:r>
-          </a:p>
-          <a:p>
-            <a:r>
-              <a:rPr lang="en-US" dirty="0" smtClean="0"/>
-              <a:t>Computer security seeks to prevent unauthorized viewing (confidentiality) or modification (integrity) of data while preserving access (availability).</a:t>
-            </a:r>
+              <a:t>Documents, Photos, Emails, Music, Videos</a:t>
+            </a:r>
+            <a:r>
+              <a:rPr lang="mr-IN" dirty="0" smtClean="0"/>
+              <a:t>…</a:t>
+            </a:r>
+            <a:endParaRPr lang="en-US" dirty="0"/>
+          </a:p>
+          <a:p>
+            <a:endParaRPr lang="en-US" dirty="0"/>
+          </a:p>
+          <a:p>
             <a:endParaRPr lang="en-US" dirty="0"/>
           </a:p>
         </p:txBody>
@@ -4415,7 +4467,7 @@
     </p:spTree>
     <p:extLst>
       <p:ext uri="{BB962C8B-B14F-4D97-AF65-F5344CB8AC3E}">
-        <p14:creationId xmlns:p14="http://schemas.microsoft.com/office/powerpoint/2010/main" val="1510113162"/>
+        <p14:creationId xmlns:p14="http://schemas.microsoft.com/office/powerpoint/2010/main" val="90903367"/>
       </p:ext>
     </p:extLst>
   </p:cSld>
@@ -4444,13 +4496,7 @@
       </p:grpSpPr>
       <p:sp>
         <p:nvSpPr>
-          <p:cNvPr id="2" name="Title 1">
-            <a:extLst>
-              <a:ext uri="{FF2B5EF4-FFF2-40B4-BE49-F238E27FC236}">
-                <a16:creationId xmlns="" xmlns:a16="http://schemas.microsoft.com/office/drawing/2014/main" id="{B6F86FCB-5BEE-4D9B-B33A-BDA24E6EFE6E}"/>
-              </a:ext>
-            </a:extLst>
-          </p:cNvPr>
+          <p:cNvPr id="2" name="Title 1"/>
           <p:cNvSpPr>
             <a:spLocks noGrp="1"/>
           </p:cNvSpPr>
@@ -4464,8 +4510,8 @@
           <a:lstStyle/>
           <a:p>
             <a:r>
-              <a:rPr lang="en-US" dirty="0" smtClean="0"/>
-              <a:t>Vulnerability </a:t>
+              <a:rPr lang="en-US" smtClean="0"/>
+              <a:t>C-I-A triad</a:t>
             </a:r>
             <a:endParaRPr lang="en-US" dirty="0"/>
           </a:p>
@@ -4473,13 +4519,7 @@
       </p:sp>
       <p:sp>
         <p:nvSpPr>
-          <p:cNvPr id="3" name="Content Placeholder 2">
-            <a:extLst>
-              <a:ext uri="{FF2B5EF4-FFF2-40B4-BE49-F238E27FC236}">
-                <a16:creationId xmlns="" xmlns:a16="http://schemas.microsoft.com/office/drawing/2014/main" id="{C748BECB-D414-4AE0-AEE7-A9D147E3D2CE}"/>
-              </a:ext>
-            </a:extLst>
-          </p:cNvPr>
+          <p:cNvPr id="3" name="Content Placeholder 2"/>
           <p:cNvSpPr>
             <a:spLocks noGrp="1"/>
           </p:cNvSpPr>
@@ -4494,48 +4534,43 @@
           <a:p>
             <a:r>
               <a:rPr lang="en-US" dirty="0" smtClean="0"/>
-              <a:t>A vulnerability is a weakness in an information system, system security procedures, internal controls, or implementation that could be exploited or triggered by a threat source. </a:t>
-            </a:r>
-          </a:p>
-          <a:p>
+              <a:t>Security Goals:</a:t>
+            </a:r>
+          </a:p>
+          <a:p>
+            <a:pPr lvl="1"/>
             <a:r>
               <a:rPr lang="en-US" dirty="0" smtClean="0"/>
-              <a:t>Categories of vulnerabilities</a:t>
+              <a:t>Availability: ensuring timely and reliable access to and use of information. </a:t>
             </a:r>
           </a:p>
           <a:p>
             <a:pPr lvl="1"/>
             <a:r>
               <a:rPr lang="en-US" dirty="0" smtClean="0"/>
-              <a:t>loss of integrity (corrupted, destroyed)</a:t>
+              <a:t>Integrity: guarding against improper information modification or destruction, and includes ensuring information non-repudiation and authenticity. </a:t>
             </a:r>
           </a:p>
           <a:p>
             <a:pPr lvl="1"/>
             <a:r>
               <a:rPr lang="en-US" dirty="0" smtClean="0"/>
-              <a:t>loss of confidentiality (leaky)</a:t>
-            </a:r>
-          </a:p>
-          <a:p>
-            <a:pPr lvl="1"/>
+              <a:t>Confidentiality: Preserving authorized restrictions on information access and disclosure, including means for protecting personal privacy and proprietary information. </a:t>
+            </a:r>
+          </a:p>
+          <a:p>
             <a:r>
               <a:rPr lang="en-US" dirty="0" smtClean="0"/>
-              <a:t>loss of availability (unavailable to access)</a:t>
-            </a:r>
-          </a:p>
-          <a:p>
-            <a:endParaRPr lang="en-US" dirty="0" smtClean="0"/>
-          </a:p>
-          <a:p>
-            <a:endParaRPr lang="en-US" dirty="0" smtClean="0"/>
+              <a:t>Computer security seeks to prevent unauthorized viewing (confidentiality) or modification (integrity) of data while preserving access (availability).</a:t>
+            </a:r>
+            <a:endParaRPr lang="en-US" dirty="0"/>
           </a:p>
         </p:txBody>
       </p:sp>
     </p:spTree>
     <p:extLst>
       <p:ext uri="{BB962C8B-B14F-4D97-AF65-F5344CB8AC3E}">
-        <p14:creationId xmlns:p14="http://schemas.microsoft.com/office/powerpoint/2010/main" val="1386842751"/>
+        <p14:creationId xmlns:p14="http://schemas.microsoft.com/office/powerpoint/2010/main" val="1510113162"/>
       </p:ext>
     </p:extLst>
   </p:cSld>
@@ -4564,7 +4599,13 @@
       </p:grpSpPr>
       <p:sp>
         <p:nvSpPr>
-          <p:cNvPr id="2" name="Title 1"/>
+          <p:cNvPr id="2" name="Title 1">
+            <a:extLst>
+              <a:ext uri="{FF2B5EF4-FFF2-40B4-BE49-F238E27FC236}">
+                <a16:creationId xmlns:a16="http://schemas.microsoft.com/office/drawing/2014/main" xmlns="" id="{B6F86FCB-5BEE-4D9B-B33A-BDA24E6EFE6E}"/>
+              </a:ext>
+            </a:extLst>
+          </p:cNvPr>
           <p:cNvSpPr>
             <a:spLocks noGrp="1"/>
           </p:cNvSpPr>
@@ -4579,7 +4620,7 @@
           <a:p>
             <a:r>
               <a:rPr lang="en-US" dirty="0" smtClean="0"/>
-              <a:t>Attack</a:t>
+              <a:t>Vulnerability </a:t>
             </a:r>
             <a:endParaRPr lang="en-US" dirty="0"/>
           </a:p>
@@ -4587,7 +4628,13 @@
       </p:sp>
       <p:sp>
         <p:nvSpPr>
-          <p:cNvPr id="3" name="Content Placeholder 2"/>
+          <p:cNvPr id="3" name="Content Placeholder 2">
+            <a:extLst>
+              <a:ext uri="{FF2B5EF4-FFF2-40B4-BE49-F238E27FC236}">
+                <a16:creationId xmlns:a16="http://schemas.microsoft.com/office/drawing/2014/main" xmlns="" id="{C748BECB-D414-4AE0-AEE7-A9D147E3D2CE}"/>
+              </a:ext>
+            </a:extLst>
+          </p:cNvPr>
           <p:cNvSpPr>
             <a:spLocks noGrp="1"/>
           </p:cNvSpPr>
@@ -4601,56 +4648,49 @@
           <a:lstStyle/>
           <a:p>
             <a:r>
-              <a:rPr lang="en-US" dirty="0"/>
-              <a:t>An attack is an attempt to gain unauthorized access to system services, resources, or information, or an attempt to compromise system integrity. </a:t>
-            </a:r>
+              <a:rPr lang="en-US" dirty="0" smtClean="0"/>
+              <a:t>A vulnerability is a weakness in an information system, system security procedures, internal controls, or implementation that could be exploited or triggered by a threat source. </a:t>
+            </a:r>
+          </a:p>
+          <a:p>
+            <a:r>
+              <a:rPr lang="en-US" dirty="0" smtClean="0"/>
+              <a:t>Categories of vulnerabilities</a:t>
+            </a:r>
+          </a:p>
+          <a:p>
+            <a:pPr lvl="1"/>
+            <a:r>
+              <a:rPr lang="en-US" dirty="0" smtClean="0"/>
+              <a:t>loss of integrity (corrupted, destroyed)</a:t>
+            </a:r>
+          </a:p>
+          <a:p>
+            <a:pPr lvl="1"/>
+            <a:r>
+              <a:rPr lang="en-US" dirty="0" smtClean="0"/>
+              <a:t>loss of confidentiality (leaky)</a:t>
+            </a:r>
+          </a:p>
+          <a:p>
+            <a:pPr lvl="1"/>
+            <a:r>
+              <a:rPr lang="en-US" dirty="0" smtClean="0"/>
+              <a:t>loss of availability (unavailable to access)</a:t>
+            </a:r>
+          </a:p>
+          <a:p>
             <a:endParaRPr lang="en-US" dirty="0" smtClean="0"/>
           </a:p>
           <a:p>
-            <a:r>
-              <a:rPr lang="en-US" dirty="0" smtClean="0"/>
-              <a:t>Can be classified into four groups:</a:t>
-            </a:r>
-          </a:p>
-          <a:p>
-            <a:pPr lvl="1"/>
-            <a:r>
-              <a:rPr lang="en-US" dirty="0" smtClean="0"/>
-              <a:t>passive attack: attempt to learn or use the information from a system, does not affect the system.</a:t>
-            </a:r>
-          </a:p>
-          <a:p>
-            <a:pPr lvl="1"/>
-            <a:r>
-              <a:rPr lang="en-US" dirty="0" smtClean="0"/>
-              <a:t>Active attack: attempt to alter system resources or change their operation.</a:t>
-            </a:r>
-          </a:p>
-          <a:p>
-            <a:pPr lvl="1"/>
-            <a:r>
-              <a:rPr lang="en-US" dirty="0" smtClean="0"/>
-              <a:t>Insider attack: attacks initiate by an insider who is authorized to access system resources. entity inside.</a:t>
-            </a:r>
-          </a:p>
-          <a:p>
-            <a:pPr lvl="1"/>
-            <a:r>
-              <a:rPr lang="en-US" dirty="0" smtClean="0"/>
-              <a:t>Outsider attack: attacks initiate by an outsider, usually an unauthorized user of the system.</a:t>
-            </a:r>
-            <a:endParaRPr lang="en-US" dirty="0"/>
-          </a:p>
-          <a:p>
-            <a:pPr lvl="1"/>
-            <a:endParaRPr lang="en-US" dirty="0"/>
+            <a:endParaRPr lang="en-US" dirty="0" smtClean="0"/>
           </a:p>
         </p:txBody>
       </p:sp>
     </p:spTree>
     <p:extLst>
       <p:ext uri="{BB962C8B-B14F-4D97-AF65-F5344CB8AC3E}">
-        <p14:creationId xmlns:p14="http://schemas.microsoft.com/office/powerpoint/2010/main" val="1348767070"/>
+        <p14:creationId xmlns:p14="http://schemas.microsoft.com/office/powerpoint/2010/main" val="1386842751"/>
       </p:ext>
     </p:extLst>
   </p:cSld>
@@ -4693,8 +4733,8 @@
           <a:lstStyle/>
           <a:p>
             <a:r>
-              <a:rPr lang="en-US" altLang="zh-CN" smtClean="0"/>
-              <a:t>Threats</a:t>
+              <a:rPr lang="en-US" dirty="0" smtClean="0"/>
+              <a:t>Attack</a:t>
             </a:r>
             <a:endParaRPr lang="en-US" dirty="0"/>
           </a:p>
@@ -4716,108 +4756,48 @@
           <a:lstStyle/>
           <a:p>
             <a:r>
-              <a:rPr lang="en-US" smtClean="0"/>
-              <a:t>A threat is any circumstance or event with the potential to adversely impact organizational operations (including mission, functions, image, or reputation), organizational assets, individuals, other organizations, or the Nation through an information system via unauthorized access, destruction, disclosure, modification of information, and/or denial of service. </a:t>
+              <a:rPr lang="en-US" dirty="0"/>
+              <a:t>An attack is an attempt to gain unauthorized access to system services, resources, or information, or an attempt to compromise system integrity. </a:t>
+            </a:r>
+            <a:endParaRPr lang="en-US" dirty="0" smtClean="0"/>
+          </a:p>
+          <a:p>
+            <a:r>
+              <a:rPr lang="en-US" dirty="0" smtClean="0"/>
+              <a:t>Can be classified into four groups:</a:t>
             </a:r>
           </a:p>
           <a:p>
             <a:pPr lvl="1"/>
             <a:r>
-              <a:rPr lang="en-US" smtClean="0"/>
-              <a:t>Threats </a:t>
-            </a:r>
-            <a:r>
-              <a:rPr lang="en-US" altLang="zh-CN" smtClean="0"/>
-              <a:t>can</a:t>
-            </a:r>
-            <a:r>
-              <a:rPr lang="zh-CN" altLang="en-US" smtClean="0"/>
-              <a:t> </a:t>
-            </a:r>
-            <a:r>
-              <a:rPr lang="en-US" altLang="zh-CN" smtClean="0"/>
-              <a:t>be</a:t>
-            </a:r>
-            <a:r>
-              <a:rPr lang="zh-CN" altLang="en-US" smtClean="0"/>
-              <a:t> </a:t>
-            </a:r>
-            <a:r>
-              <a:rPr lang="en-US" altLang="zh-CN" smtClean="0"/>
-              <a:t>malicious</a:t>
-            </a:r>
-            <a:r>
-              <a:rPr lang="zh-CN" altLang="en-US" smtClean="0"/>
-              <a:t> </a:t>
-            </a:r>
-            <a:r>
-              <a:rPr lang="en-US" altLang="zh-CN" smtClean="0"/>
-              <a:t>or</a:t>
-            </a:r>
-            <a:r>
-              <a:rPr lang="zh-CN" altLang="en-US" smtClean="0"/>
-              <a:t> </a:t>
-            </a:r>
-            <a:r>
-              <a:rPr lang="en-US" altLang="zh-CN" smtClean="0"/>
-              <a:t>non-malicious.</a:t>
+              <a:rPr lang="en-US" dirty="0" smtClean="0"/>
+              <a:t>passive attack: attempt to learn or use the information from a system, does not affect the system.</a:t>
             </a:r>
           </a:p>
           <a:p>
             <a:pPr lvl="1"/>
             <a:r>
-              <a:rPr lang="en-US" altLang="zh-CN" smtClean="0"/>
-              <a:t>Threats</a:t>
-            </a:r>
-            <a:r>
-              <a:rPr lang="zh-CN" altLang="en-US" smtClean="0"/>
-              <a:t> </a:t>
-            </a:r>
-            <a:r>
-              <a:rPr lang="en-US" altLang="zh-CN" smtClean="0"/>
-              <a:t>can</a:t>
-            </a:r>
-            <a:r>
-              <a:rPr lang="zh-CN" altLang="en-US" smtClean="0"/>
-              <a:t> </a:t>
-            </a:r>
-            <a:r>
-              <a:rPr lang="en-US" altLang="zh-CN" smtClean="0"/>
-              <a:t>be</a:t>
-            </a:r>
-            <a:r>
-              <a:rPr lang="zh-CN" altLang="en-US" smtClean="0"/>
-              <a:t> </a:t>
-            </a:r>
-            <a:r>
-              <a:rPr lang="en-US" altLang="zh-CN" smtClean="0"/>
-              <a:t>caused</a:t>
-            </a:r>
-            <a:r>
-              <a:rPr lang="zh-CN" altLang="en-US" smtClean="0"/>
-              <a:t> </a:t>
-            </a:r>
-            <a:r>
-              <a:rPr lang="en-US" altLang="zh-CN" smtClean="0"/>
-              <a:t>by</a:t>
-            </a:r>
-            <a:r>
-              <a:rPr lang="zh-CN" altLang="en-US" smtClean="0"/>
-              <a:t> </a:t>
-            </a:r>
-            <a:r>
-              <a:rPr lang="en-US" smtClean="0"/>
-              <a:t>human and other sources.</a:t>
+              <a:rPr lang="en-US" dirty="0" smtClean="0"/>
+              <a:t>Active attack: attempt to alter system resources or change their operation.</a:t>
             </a:r>
           </a:p>
           <a:p>
             <a:pPr lvl="1"/>
             <a:r>
-              <a:rPr lang="en-US" smtClean="0"/>
-              <a:t>Threats can be targeted or random.</a:t>
-            </a:r>
-          </a:p>
-          <a:p>
+              <a:rPr lang="en-US" dirty="0" smtClean="0"/>
+              <a:t>Insider attack: attacks initiate by an insider who is authorized to access system resources. entity inside.</a:t>
+            </a:r>
+          </a:p>
+          <a:p>
+            <a:pPr lvl="1"/>
+            <a:r>
+              <a:rPr lang="en-US" dirty="0" smtClean="0"/>
+              <a:t>Outsider attack: attacks initiate by an outsider, usually an unauthorized user of the system.</a:t>
+            </a:r>
+            <a:endParaRPr lang="en-US" dirty="0"/>
+          </a:p>
+          <a:p>
+            <a:pPr lvl="1"/>
             <a:endParaRPr lang="en-US" dirty="0"/>
           </a:p>
         </p:txBody>
@@ -4825,7 +4805,7 @@
     </p:spTree>
     <p:extLst>
       <p:ext uri="{BB962C8B-B14F-4D97-AF65-F5344CB8AC3E}">
-        <p14:creationId xmlns:p14="http://schemas.microsoft.com/office/powerpoint/2010/main" val="702449093"/>
+        <p14:creationId xmlns:p14="http://schemas.microsoft.com/office/powerpoint/2010/main" val="1348767070"/>
       </p:ext>
     </p:extLst>
   </p:cSld>
@@ -4868,8 +4848,8 @@
           <a:lstStyle/>
           <a:p>
             <a:r>
-              <a:rPr lang="en-US" smtClean="0"/>
-              <a:t>Harm</a:t>
+              <a:rPr lang="en-US" altLang="zh-CN" smtClean="0"/>
+              <a:t>Threats</a:t>
             </a:r>
             <a:endParaRPr lang="en-US" dirty="0"/>
           </a:p>
@@ -4891,29 +4871,105 @@
           <a:lstStyle/>
           <a:p>
             <a:r>
-              <a:rPr lang="en-US" dirty="0" smtClean="0"/>
-              <a:t>The negative consequence of an attack is harm.</a:t>
-            </a:r>
-          </a:p>
-          <a:p>
-            <a:r>
-              <a:rPr lang="en-US" dirty="0"/>
-              <a:t>Harm occurs when a vulnerability is exploited by attackers. </a:t>
-            </a:r>
-            <a:endParaRPr lang="en-US" dirty="0" smtClean="0"/>
-          </a:p>
-          <a:p>
-            <a:r>
-              <a:rPr lang="en-US" dirty="0" smtClean="0"/>
+              <a:rPr lang="en-US" smtClean="0"/>
+              <a:t>A threat is any circumstance or event with the potential to adversely impact organizational operations (including mission, functions, image, or reputation), organizational assets, individuals, other organizations, or the Nation through an information system via unauthorized access, destruction, disclosure, modification of information, and/or denial of service. </a:t>
+            </a:r>
+          </a:p>
+          <a:p>
+            <a:pPr lvl="1"/>
+            <a:r>
+              <a:rPr lang="en-US" smtClean="0"/>
+              <a:t>Threats </a:t>
+            </a:r>
+            <a:r>
+              <a:rPr lang="en-US" altLang="zh-CN" smtClean="0"/>
+              <a:t>can</a:t>
+            </a:r>
+            <a:r>
+              <a:rPr lang="zh-CN" altLang="en-US" smtClean="0"/>
               <a:t> </a:t>
             </a:r>
             <a:r>
-              <a:rPr lang="en-US" dirty="0"/>
-              <a:t>W</a:t>
-            </a:r>
-            <a:r>
-              <a:rPr lang="en-US" dirty="0" smtClean="0"/>
-              <a:t>e protect ourselves against threats in order to reduce or eliminate harm. </a:t>
+              <a:rPr lang="en-US" altLang="zh-CN" smtClean="0"/>
+              <a:t>be</a:t>
+            </a:r>
+            <a:r>
+              <a:rPr lang="zh-CN" altLang="en-US" smtClean="0"/>
+              <a:t> </a:t>
+            </a:r>
+            <a:r>
+              <a:rPr lang="en-US" altLang="zh-CN" smtClean="0"/>
+              <a:t>malicious</a:t>
+            </a:r>
+            <a:r>
+              <a:rPr lang="zh-CN" altLang="en-US" smtClean="0"/>
+              <a:t> </a:t>
+            </a:r>
+            <a:r>
+              <a:rPr lang="en-US" altLang="zh-CN" smtClean="0"/>
+              <a:t>or</a:t>
+            </a:r>
+            <a:r>
+              <a:rPr lang="zh-CN" altLang="en-US" smtClean="0"/>
+              <a:t> </a:t>
+            </a:r>
+            <a:r>
+              <a:rPr lang="en-US" altLang="zh-CN" smtClean="0"/>
+              <a:t>non-malicious.</a:t>
+            </a:r>
+          </a:p>
+          <a:p>
+            <a:pPr lvl="1"/>
+            <a:r>
+              <a:rPr lang="en-US" altLang="zh-CN" smtClean="0"/>
+              <a:t>Threats</a:t>
+            </a:r>
+            <a:r>
+              <a:rPr lang="zh-CN" altLang="en-US" smtClean="0"/>
+              <a:t> </a:t>
+            </a:r>
+            <a:r>
+              <a:rPr lang="en-US" altLang="zh-CN" smtClean="0"/>
+              <a:t>can</a:t>
+            </a:r>
+            <a:r>
+              <a:rPr lang="zh-CN" altLang="en-US" smtClean="0"/>
+              <a:t> </a:t>
+            </a:r>
+            <a:r>
+              <a:rPr lang="en-US" altLang="zh-CN" smtClean="0"/>
+              <a:t>be</a:t>
+            </a:r>
+            <a:r>
+              <a:rPr lang="zh-CN" altLang="en-US" smtClean="0"/>
+              <a:t> </a:t>
+            </a:r>
+            <a:r>
+              <a:rPr lang="en-US" altLang="zh-CN" smtClean="0"/>
+              <a:t>caused</a:t>
+            </a:r>
+            <a:r>
+              <a:rPr lang="zh-CN" altLang="en-US" smtClean="0"/>
+              <a:t> </a:t>
+            </a:r>
+            <a:r>
+              <a:rPr lang="en-US" altLang="zh-CN" smtClean="0"/>
+              <a:t>by</a:t>
+            </a:r>
+            <a:r>
+              <a:rPr lang="zh-CN" altLang="en-US" smtClean="0"/>
+              <a:t> </a:t>
+            </a:r>
+            <a:r>
+              <a:rPr lang="en-US" smtClean="0"/>
+              <a:t>human and other sources.</a:t>
+            </a:r>
+          </a:p>
+          <a:p>
+            <a:pPr lvl="1"/>
+            <a:r>
+              <a:rPr lang="en-US" smtClean="0"/>
+              <a:t>Threats can be targeted or random.</a:t>
             </a:r>
           </a:p>
           <a:p>
@@ -4924,7 +4980,7 @@
     </p:spTree>
     <p:extLst>
       <p:ext uri="{BB962C8B-B14F-4D97-AF65-F5344CB8AC3E}">
-        <p14:creationId xmlns:p14="http://schemas.microsoft.com/office/powerpoint/2010/main" val="1070511061"/>
+        <p14:creationId xmlns:p14="http://schemas.microsoft.com/office/powerpoint/2010/main" val="702449093"/>
       </p:ext>
     </p:extLst>
   </p:cSld>
@@ -4967,8 +5023,8 @@
           <a:lstStyle/>
           <a:p>
             <a:r>
-              <a:rPr lang="en-US" dirty="0" smtClean="0"/>
-              <a:t>Risk</a:t>
+              <a:rPr lang="en-US" smtClean="0"/>
+              <a:t>Harm</a:t>
             </a:r>
             <a:endParaRPr lang="en-US" dirty="0"/>
           </a:p>
@@ -4990,16 +5046,40 @@
           <a:lstStyle/>
           <a:p>
             <a:r>
-              <a:rPr lang="en-US" dirty="0"/>
-              <a:t>The level of impact on organizational operations (including mission, functions, image, or reputation), organizational assets, or individuals resulting from the operation of an information system given the potential impact of a threat and the likelihood of that threat occurring. </a:t>
-            </a:r>
+              <a:rPr lang="en-US" dirty="0" smtClean="0"/>
+              <a:t>The negative consequence of an attack is harm.</a:t>
+            </a:r>
+          </a:p>
+          <a:p>
+            <a:r>
+              <a:rPr lang="en-US" dirty="0"/>
+              <a:t>Harm occurs when a vulnerability is exploited by attackers. </a:t>
+            </a:r>
+            <a:endParaRPr lang="en-US" dirty="0" smtClean="0"/>
+          </a:p>
+          <a:p>
+            <a:r>
+              <a:rPr lang="en-US" dirty="0" smtClean="0"/>
+              <a:t> </a:t>
+            </a:r>
+            <a:r>
+              <a:rPr lang="en-US" dirty="0"/>
+              <a:t>W</a:t>
+            </a:r>
+            <a:r>
+              <a:rPr lang="en-US" dirty="0" smtClean="0"/>
+              <a:t>e protect ourselves against threats in order to reduce or eliminate harm. </a:t>
+            </a:r>
+          </a:p>
+          <a:p>
+            <a:endParaRPr lang="en-US" dirty="0"/>
           </a:p>
         </p:txBody>
       </p:sp>
     </p:spTree>
     <p:extLst>
       <p:ext uri="{BB962C8B-B14F-4D97-AF65-F5344CB8AC3E}">
-        <p14:creationId xmlns:p14="http://schemas.microsoft.com/office/powerpoint/2010/main" val="742327003"/>
+        <p14:creationId xmlns:p14="http://schemas.microsoft.com/office/powerpoint/2010/main" val="1070511061"/>
       </p:ext>
     </p:extLst>
   </p:cSld>
@@ -5042,8 +5122,8 @@
           <a:lstStyle/>
           <a:p>
             <a:r>
-              <a:rPr lang="en-US" smtClean="0"/>
-              <a:t>Controls</a:t>
+              <a:rPr lang="en-US" dirty="0" smtClean="0"/>
+              <a:t>Risk</a:t>
             </a:r>
             <a:endParaRPr lang="en-US" dirty="0"/>
           </a:p>
@@ -5065,49 +5145,8 @@
           <a:lstStyle/>
           <a:p>
             <a:r>
-              <a:rPr lang="en-US" dirty="0" smtClean="0"/>
-              <a:t>A control or countermeasure is a means to counter threats. </a:t>
-            </a:r>
-          </a:p>
-          <a:p>
-            <a:r>
-              <a:rPr lang="en-US" dirty="0" smtClean="0"/>
-              <a:t>We can deal with harm in several ways:</a:t>
-            </a:r>
-          </a:p>
-          <a:p>
-            <a:pPr lvl="1"/>
-            <a:r>
-              <a:rPr lang="en-US" dirty="0" smtClean="0"/>
-              <a:t>Prevent it, by blocking the attack or closing the vulnerability.</a:t>
-            </a:r>
-          </a:p>
-          <a:p>
-            <a:pPr lvl="1"/>
-            <a:r>
-              <a:rPr lang="en-US" dirty="0" smtClean="0"/>
-              <a:t>Deter it, by making the attack harder (but not impossible).</a:t>
-            </a:r>
-          </a:p>
-          <a:p>
-            <a:pPr lvl="1"/>
-            <a:r>
-              <a:rPr lang="en-US" dirty="0" smtClean="0"/>
-              <a:t>Deflect it, by making another target more attractive.</a:t>
-            </a:r>
-          </a:p>
-          <a:p>
-            <a:pPr lvl="1"/>
-            <a:r>
-              <a:rPr lang="en-US" dirty="0" smtClean="0"/>
-              <a:t>Mitigate it, by lowing the negative impact.</a:t>
-            </a:r>
-          </a:p>
-          <a:p>
-            <a:pPr lvl="1"/>
-            <a:r>
-              <a:rPr lang="en-US" dirty="0" smtClean="0"/>
-              <a:t>Detect it, either as it happens or after it happed.</a:t>
+              <a:rPr lang="en-US" dirty="0"/>
+              <a:t>The level of impact on organizational operations (including mission, functions, image, or reputation), organizational assets, or individuals resulting from the operation of an information system given the potential impact of a threat and the likelihood of that threat occurring. </a:t>
             </a:r>
           </a:p>
         </p:txBody>
@@ -5115,7 +5154,7 @@
     </p:spTree>
     <p:extLst>
       <p:ext uri="{BB962C8B-B14F-4D97-AF65-F5344CB8AC3E}">
-        <p14:creationId xmlns:p14="http://schemas.microsoft.com/office/powerpoint/2010/main" val="461407661"/>
+        <p14:creationId xmlns:p14="http://schemas.microsoft.com/office/powerpoint/2010/main" val="742327003"/>
       </p:ext>
     </p:extLst>
   </p:cSld>
@@ -5159,7 +5198,7 @@
           <a:p>
             <a:r>
               <a:rPr lang="en-US" smtClean="0"/>
-              <a:t>Types of controls</a:t>
+              <a:t>Controls</a:t>
             </a:r>
             <a:endParaRPr lang="en-US" dirty="0"/>
           </a:p>
@@ -5182,28 +5221,56 @@
           <a:p>
             <a:r>
               <a:rPr lang="en-US" dirty="0" smtClean="0"/>
-              <a:t>Technical/Software controls – internal program controls, operating system, and network system controls, independent control programs.</a:t>
+              <a:t>A control or countermeasure is a means to counter threats. </a:t>
             </a:r>
           </a:p>
           <a:p>
             <a:r>
               <a:rPr lang="en-US" dirty="0" smtClean="0"/>
-              <a:t>Physical/Hardware controls – hardware implementation of encryption, physical locks, biometric devices, hardware interlocks.</a:t>
-            </a:r>
-          </a:p>
-          <a:p>
+              <a:t>We can deal with harm in several ways:</a:t>
+            </a:r>
+          </a:p>
+          <a:p>
+            <a:pPr lvl="1"/>
             <a:r>
               <a:rPr lang="en-US" dirty="0" smtClean="0"/>
-              <a:t>Procedural/Policies controls – training and awareness, laws, regulations, contracts, agreements.</a:t>
-            </a:r>
-            <a:endParaRPr lang="en-US" dirty="0"/>
+              <a:t>Prevent it, by blocking the attack or closing the vulnerability.</a:t>
+            </a:r>
+          </a:p>
+          <a:p>
+            <a:pPr lvl="1"/>
+            <a:r>
+              <a:rPr lang="en-US" dirty="0" smtClean="0"/>
+              <a:t>Deter it, by making the attack harder (but not impossible).</a:t>
+            </a:r>
+          </a:p>
+          <a:p>
+            <a:pPr lvl="1"/>
+            <a:r>
+              <a:rPr lang="en-US" dirty="0" smtClean="0"/>
+              <a:t>Deflect it, by making another target more attractive.</a:t>
+            </a:r>
+          </a:p>
+          <a:p>
+            <a:pPr lvl="1"/>
+            <a:r>
+              <a:rPr lang="en-US" dirty="0" smtClean="0"/>
+              <a:t>Mitigate it, by lowing the negative impact.</a:t>
+            </a:r>
+          </a:p>
+          <a:p>
+            <a:pPr lvl="1"/>
+            <a:r>
+              <a:rPr lang="en-US" dirty="0" smtClean="0"/>
+              <a:t>Detect it, either as it happens or after it happed.</a:t>
+            </a:r>
           </a:p>
         </p:txBody>
       </p:sp>
     </p:spTree>
     <p:extLst>
       <p:ext uri="{BB962C8B-B14F-4D97-AF65-F5344CB8AC3E}">
-        <p14:creationId xmlns:p14="http://schemas.microsoft.com/office/powerpoint/2010/main" val="315109110"/>
+        <p14:creationId xmlns:p14="http://schemas.microsoft.com/office/powerpoint/2010/main" val="461407661"/>
       </p:ext>
     </p:extLst>
   </p:cSld>
@@ -5246,8 +5313,8 @@
           <a:lstStyle/>
           <a:p>
             <a:r>
-              <a:rPr lang="en-US" dirty="0" smtClean="0"/>
-              <a:t>Active learning activity:</a:t>
+              <a:rPr lang="en-US" smtClean="0"/>
+              <a:t>Types of controls</a:t>
             </a:r>
             <a:endParaRPr lang="en-US" dirty="0"/>
           </a:p>
@@ -5269,65 +5336,21 @@
           <a:lstStyle/>
           <a:p>
             <a:r>
-              <a:rPr lang="en-US" dirty="0"/>
-              <a:t>Why do people attack</a:t>
-            </a:r>
-            <a:r>
               <a:rPr lang="en-US" dirty="0" smtClean="0"/>
-              <a:t>? </a:t>
+              <a:t>Technical/Software controls – internal program controls, operating system, and network system controls, independent control programs.</a:t>
             </a:r>
           </a:p>
           <a:p>
             <a:r>
               <a:rPr lang="en-US" dirty="0" smtClean="0"/>
-              <a:t>What </a:t>
-            </a:r>
-            <a:r>
-              <a:rPr lang="en-US" dirty="0"/>
-              <a:t>should we do in cybersecurity</a:t>
-            </a:r>
+              <a:t>Physical/Hardware controls – hardware implementation of encryption, physical locks, biometric devices, hardware interlocks.</a:t>
+            </a:r>
+          </a:p>
+          <a:p>
             <a:r>
               <a:rPr lang="en-US" dirty="0" smtClean="0"/>
-              <a:t>?</a:t>
-            </a:r>
-          </a:p>
-          <a:p>
-            <a:pPr lvl="1"/>
-            <a:r>
-              <a:rPr lang="en-US" dirty="0" smtClean="0"/>
-              <a:t>Reduce vulnerabilities</a:t>
-            </a:r>
-          </a:p>
-          <a:p>
-            <a:pPr lvl="1"/>
-            <a:r>
-              <a:rPr lang="en-US" dirty="0" smtClean="0"/>
-              <a:t>Prevention bad things from happening</a:t>
-            </a:r>
-          </a:p>
-          <a:p>
-            <a:pPr lvl="1"/>
-            <a:r>
-              <a:rPr lang="en-US" dirty="0" smtClean="0"/>
-              <a:t>Detect any potential threats</a:t>
-            </a:r>
-          </a:p>
-          <a:p>
-            <a:pPr lvl="1"/>
-            <a:r>
-              <a:rPr lang="en-US" dirty="0" smtClean="0"/>
-              <a:t>Response quickly if something bad happened (try to reduce the harm)</a:t>
-            </a:r>
-          </a:p>
-          <a:p>
-            <a:pPr lvl="1"/>
-            <a:r>
-              <a:rPr lang="mr-IN" dirty="0" smtClean="0"/>
-              <a:t>…</a:t>
-            </a:r>
-            <a:endParaRPr lang="en-US" dirty="0"/>
-          </a:p>
-          <a:p>
+              <a:t>Procedural/Policies controls – training and awareness, laws, regulations, contracts, agreements.</a:t>
+            </a:r>
             <a:endParaRPr lang="en-US" dirty="0"/>
           </a:p>
         </p:txBody>
@@ -5335,7 +5358,7 @@
     </p:spTree>
     <p:extLst>
       <p:ext uri="{BB962C8B-B14F-4D97-AF65-F5344CB8AC3E}">
-        <p14:creationId xmlns:p14="http://schemas.microsoft.com/office/powerpoint/2010/main" val="957288433"/>
+        <p14:creationId xmlns:p14="http://schemas.microsoft.com/office/powerpoint/2010/main" val="315109110"/>
       </p:ext>
     </p:extLst>
   </p:cSld>
@@ -5497,7 +5520,7 @@
           <a:p>
             <a:r>
               <a:rPr lang="en-US" dirty="0" smtClean="0"/>
-              <a:t>Summary</a:t>
+              <a:t>Active learning activity:</a:t>
             </a:r>
             <a:endParaRPr lang="en-US" dirty="0"/>
           </a:p>
@@ -5520,29 +5543,62 @@
           <a:p>
             <a:r>
               <a:rPr lang="en-US" dirty="0"/>
-              <a:t>Topics:</a:t>
+              <a:t>Why do people attack</a:t>
+            </a:r>
+            <a:r>
+              <a:rPr lang="en-US" dirty="0" smtClean="0"/>
+              <a:t>? </a:t>
+            </a:r>
+          </a:p>
+          <a:p>
+            <a:r>
+              <a:rPr lang="en-US" dirty="0" smtClean="0"/>
+              <a:t>What </a:t>
+            </a:r>
+            <a:r>
+              <a:rPr lang="en-US" dirty="0"/>
+              <a:t>should we do in cybersecurity</a:t>
+            </a:r>
+            <a:r>
+              <a:rPr lang="en-US" dirty="0" smtClean="0"/>
+              <a:t>?</a:t>
             </a:r>
           </a:p>
           <a:p>
             <a:pPr lvl="1"/>
             <a:r>
-              <a:rPr lang="en-US" sz="2800" dirty="0"/>
-              <a:t>Computer system and computer security</a:t>
+              <a:rPr lang="en-US" dirty="0" smtClean="0"/>
+              <a:t>Reduce vulnerabilities</a:t>
             </a:r>
           </a:p>
           <a:p>
             <a:pPr lvl="1"/>
             <a:r>
-              <a:rPr lang="en-US" sz="2800" dirty="0"/>
-              <a:t>Vulnerability, threat, risk, attack.</a:t>
+              <a:rPr lang="en-US" dirty="0" smtClean="0"/>
+              <a:t>Prevention bad things from happening</a:t>
             </a:r>
           </a:p>
           <a:p>
             <a:pPr lvl="1"/>
             <a:r>
-              <a:rPr lang="en-US" sz="2800" dirty="0"/>
-              <a:t>Control, countermeasure.</a:t>
-            </a:r>
+              <a:rPr lang="en-US" dirty="0" smtClean="0"/>
+              <a:t>Detect any potential threats</a:t>
+            </a:r>
+          </a:p>
+          <a:p>
+            <a:pPr lvl="1"/>
+            <a:r>
+              <a:rPr lang="en-US" dirty="0" smtClean="0"/>
+              <a:t>Response quickly if something bad happened (try to reduce the harm)</a:t>
+            </a:r>
+          </a:p>
+          <a:p>
+            <a:pPr lvl="1"/>
+            <a:r>
+              <a:rPr lang="mr-IN" dirty="0" smtClean="0"/>
+              <a:t>…</a:t>
+            </a:r>
+            <a:endParaRPr lang="en-US" dirty="0"/>
           </a:p>
           <a:p>
             <a:endParaRPr lang="en-US" dirty="0"/>
@@ -5552,7 +5608,7 @@
     </p:spTree>
     <p:extLst>
       <p:ext uri="{BB962C8B-B14F-4D97-AF65-F5344CB8AC3E}">
-        <p14:creationId xmlns:p14="http://schemas.microsoft.com/office/powerpoint/2010/main" val="276835025"/>
+        <p14:creationId xmlns:p14="http://schemas.microsoft.com/office/powerpoint/2010/main" val="957288433"/>
       </p:ext>
     </p:extLst>
   </p:cSld>
@@ -5581,10 +5637,109 @@
       </p:grpSpPr>
       <p:sp>
         <p:nvSpPr>
+          <p:cNvPr id="2" name="Title 1"/>
+          <p:cNvSpPr>
+            <a:spLocks noGrp="1"/>
+          </p:cNvSpPr>
+          <p:nvPr>
+            <p:ph type="title"/>
+          </p:nvPr>
+        </p:nvSpPr>
+        <p:spPr/>
+        <p:txBody>
+          <a:bodyPr/>
+          <a:lstStyle/>
+          <a:p>
+            <a:r>
+              <a:rPr lang="en-US" dirty="0" smtClean="0"/>
+              <a:t>Summary</a:t>
+            </a:r>
+            <a:endParaRPr lang="en-US" dirty="0"/>
+          </a:p>
+        </p:txBody>
+      </p:sp>
+      <p:sp>
+        <p:nvSpPr>
+          <p:cNvPr id="3" name="Content Placeholder 2"/>
+          <p:cNvSpPr>
+            <a:spLocks noGrp="1"/>
+          </p:cNvSpPr>
+          <p:nvPr>
+            <p:ph idx="1"/>
+          </p:nvPr>
+        </p:nvSpPr>
+        <p:spPr/>
+        <p:txBody>
+          <a:bodyPr/>
+          <a:lstStyle/>
+          <a:p>
+            <a:r>
+              <a:rPr lang="en-US" dirty="0"/>
+              <a:t>Topics:</a:t>
+            </a:r>
+          </a:p>
+          <a:p>
+            <a:pPr lvl="1"/>
+            <a:r>
+              <a:rPr lang="en-US" sz="2800" dirty="0"/>
+              <a:t>Computer system and computer security</a:t>
+            </a:r>
+          </a:p>
+          <a:p>
+            <a:pPr lvl="1"/>
+            <a:r>
+              <a:rPr lang="en-US" sz="2800" dirty="0"/>
+              <a:t>Vulnerability, threat, risk, attack.</a:t>
+            </a:r>
+          </a:p>
+          <a:p>
+            <a:pPr lvl="1"/>
+            <a:r>
+              <a:rPr lang="en-US" sz="2800" dirty="0"/>
+              <a:t>Control, countermeasure.</a:t>
+            </a:r>
+          </a:p>
+          <a:p>
+            <a:endParaRPr lang="en-US" dirty="0"/>
+          </a:p>
+        </p:txBody>
+      </p:sp>
+    </p:spTree>
+    <p:extLst>
+      <p:ext uri="{BB962C8B-B14F-4D97-AF65-F5344CB8AC3E}">
+        <p14:creationId xmlns:p14="http://schemas.microsoft.com/office/powerpoint/2010/main" val="276835025"/>
+      </p:ext>
+    </p:extLst>
+  </p:cSld>
+  <p:clrMapOvr>
+    <a:masterClrMapping/>
+  </p:clrMapOvr>
+</p:sld>
+</file>
+
+<file path=ppt/slides/slide22.xml><?xml version="1.0" encoding="utf-8"?>
+<p:sld xmlns:a="http://schemas.openxmlformats.org/drawingml/2006/main" xmlns:r="http://schemas.openxmlformats.org/officeDocument/2006/relationships" xmlns:p="http://schemas.openxmlformats.org/presentationml/2006/main">
+  <p:cSld>
+    <p:spTree>
+      <p:nvGrpSpPr>
+        <p:cNvPr id="1" name=""/>
+        <p:cNvGrpSpPr/>
+        <p:nvPr/>
+      </p:nvGrpSpPr>
+      <p:grpSpPr>
+        <a:xfrm>
+          <a:off x="0" y="0"/>
+          <a:ext cx="0" cy="0"/>
+          <a:chOff x="0" y="0"/>
+          <a:chExt cx="0" cy="0"/>
+        </a:xfrm>
+      </p:grpSpPr>
+      <p:sp>
+        <p:nvSpPr>
           <p:cNvPr id="8" name="Title 1">
             <a:extLst>
               <a:ext uri="{FF2B5EF4-FFF2-40B4-BE49-F238E27FC236}">
-                <a16:creationId xmlns="" xmlns:a16="http://schemas.microsoft.com/office/drawing/2014/main" id="{992F630B-24C8-4726-85FB-CF06F2B12F86}"/>
+                <a16:creationId xmlns:a16="http://schemas.microsoft.com/office/drawing/2014/main" xmlns="" id="{992F630B-24C8-4726-85FB-CF06F2B12F86}"/>
               </a:ext>
             </a:extLst>
           </p:cNvPr>
@@ -5841,7 +5996,7 @@
           <p:cNvPr id="2" name="Title 1">
             <a:extLst>
               <a:ext uri="{FF2B5EF4-FFF2-40B4-BE49-F238E27FC236}">
-                <a16:creationId xmlns="" xmlns:a16="http://schemas.microsoft.com/office/drawing/2014/main" id="{6A756ECD-64D5-48E0-A7C0-CD044B1293DC}"/>
+                <a16:creationId xmlns:a16="http://schemas.microsoft.com/office/drawing/2014/main" xmlns="" id="{6A756ECD-64D5-48E0-A7C0-CD044B1293DC}"/>
               </a:ext>
             </a:extLst>
           </p:cNvPr>
@@ -5870,7 +6025,7 @@
           <p:cNvPr id="3" name="Content Placeholder 2">
             <a:extLst>
               <a:ext uri="{FF2B5EF4-FFF2-40B4-BE49-F238E27FC236}">
-                <a16:creationId xmlns="" xmlns:a16="http://schemas.microsoft.com/office/drawing/2014/main" id="{D15B6AE7-D0A1-4AEA-A843-13781ADE744C}"/>
+                <a16:creationId xmlns:a16="http://schemas.microsoft.com/office/drawing/2014/main" xmlns="" id="{D15B6AE7-D0A1-4AEA-A843-13781ADE744C}"/>
               </a:ext>
             </a:extLst>
           </p:cNvPr>
@@ -5886,39 +6041,53 @@
           <a:bodyPr/>
           <a:lstStyle/>
           <a:p>
-            <a:r>
-              <a:rPr lang="en-US" sz="2400" dirty="0" smtClean="0"/>
-              <a:t>Students will be able to understand most of the common and standard terms in the domain of information assurance.</a:t>
-            </a:r>
-          </a:p>
-          <a:p>
-            <a:r>
-              <a:rPr lang="en-US" sz="2400" dirty="0" smtClean="0"/>
-              <a:t>Students will be able to understand common software vulnerabilities and their prevention and mitigation.</a:t>
-            </a:r>
-          </a:p>
-          <a:p>
-            <a:r>
-              <a:rPr lang="en-US" sz="2400" dirty="0" smtClean="0"/>
-              <a:t>Students will be able to understand common network security attacks and their countermeasures.</a:t>
-            </a:r>
-          </a:p>
-          <a:p>
-            <a:r>
-              <a:rPr lang="en-US" sz="2400" dirty="0" smtClean="0"/>
-              <a:t>Students will be able to understand secure design principles, secure coding, and software testing.</a:t>
-            </a:r>
-          </a:p>
-          <a:p>
-            <a:r>
-              <a:rPr lang="en-US" sz="2400" dirty="0" smtClean="0"/>
-              <a:t>Students will be able to understand general operating system security and security in the design of operating systems.</a:t>
-            </a:r>
-          </a:p>
-          <a:p>
-            <a:r>
-              <a:rPr lang="en-US" sz="2400" dirty="0" smtClean="0"/>
-              <a:t>Students will be able to understand secure system administration, security policies, and risk analysis.</a:t>
+            <a:pPr lvl="0"/>
+            <a:r>
+              <a:rPr lang="en-US" sz="2200" dirty="0"/>
+              <a:t>Students will be able to understand basic security concepts, such as availability, confidentiality, integrity, authentication, authorization, and accountability.</a:t>
+            </a:r>
+          </a:p>
+          <a:p>
+            <a:pPr lvl="0"/>
+            <a:r>
+              <a:rPr lang="en-US" sz="2200" dirty="0"/>
+              <a:t>Students will be able to explain fundamental concepts and techniques related to authentication and access control. </a:t>
+            </a:r>
+          </a:p>
+          <a:p>
+            <a:pPr lvl="0"/>
+            <a:r>
+              <a:rPr lang="en-US" sz="2200" dirty="0"/>
+              <a:t>Students will be able to describe the classical cryptography and modern ones that are being used, such as RSA, AES, DES. </a:t>
+            </a:r>
+          </a:p>
+          <a:p>
+            <a:pPr lvl="0"/>
+            <a:r>
+              <a:rPr lang="en-US" sz="2200" dirty="0"/>
+              <a:t>Students will be able to describe the common software vulnerabilities, such as buffer overflow, integer overflow and wrap around, off by one, and to understand the ways to prevent them.</a:t>
+            </a:r>
+          </a:p>
+          <a:p>
+            <a:pPr lvl="0"/>
+            <a:r>
+              <a:rPr lang="en-US" sz="2200" dirty="0"/>
+              <a:t>Students will be able to list fundamentals of secure coding, secure design principles.</a:t>
+            </a:r>
+          </a:p>
+          <a:p>
+            <a:pPr lvl="0"/>
+            <a:r>
+              <a:rPr lang="en-US" sz="2200" dirty="0"/>
+              <a:t>Students will be able to demonstrate how viruses, </a:t>
+            </a:r>
+            <a:r>
+              <a:rPr lang="en-US" sz="2200" dirty="0" err="1"/>
+              <a:t>trojan</a:t>
+            </a:r>
+            <a:r>
+              <a:rPr lang="en-US" sz="2200" dirty="0"/>
+              <a:t> horses and worms work and the countermeasures for these malwares. </a:t>
             </a:r>
           </a:p>
           <a:p>
@@ -5958,7 +6127,13 @@
       </p:grpSpPr>
       <p:sp>
         <p:nvSpPr>
-          <p:cNvPr id="2" name="Title 1"/>
+          <p:cNvPr id="2" name="Title 1">
+            <a:extLst>
+              <a:ext uri="{FF2B5EF4-FFF2-40B4-BE49-F238E27FC236}">
+                <a16:creationId xmlns:a16="http://schemas.microsoft.com/office/drawing/2014/main" xmlns="" id="{6A756ECD-64D5-48E0-A7C0-CD044B1293DC}"/>
+              </a:ext>
+            </a:extLst>
+          </p:cNvPr>
           <p:cNvSpPr>
             <a:spLocks noGrp="1"/>
           </p:cNvSpPr>
@@ -5972,8 +6147,8 @@
           <a:lstStyle/>
           <a:p>
             <a:r>
-              <a:rPr lang="en-US" smtClean="0"/>
-              <a:t>Module 1: Introduction to Cyber Security Concepts</a:t>
+              <a:rPr lang="en-US" dirty="0" smtClean="0"/>
+              <a:t>Learning Outcomes (cont.)</a:t>
             </a:r>
             <a:endParaRPr lang="en-US" dirty="0"/>
           </a:p>
@@ -5981,7 +6156,13 @@
       </p:sp>
       <p:sp>
         <p:nvSpPr>
-          <p:cNvPr id="3" name="Content Placeholder 2"/>
+          <p:cNvPr id="3" name="Content Placeholder 2">
+            <a:extLst>
+              <a:ext uri="{FF2B5EF4-FFF2-40B4-BE49-F238E27FC236}">
+                <a16:creationId xmlns:a16="http://schemas.microsoft.com/office/drawing/2014/main" xmlns="" id="{D15B6AE7-D0A1-4AEA-A843-13781ADE744C}"/>
+              </a:ext>
+            </a:extLst>
+          </p:cNvPr>
           <p:cNvSpPr>
             <a:spLocks noGrp="1"/>
           </p:cNvSpPr>
@@ -5994,42 +6175,63 @@
           <a:bodyPr/>
           <a:lstStyle/>
           <a:p>
-            <a:r>
-              <a:rPr lang="en-US" sz="2400" dirty="0"/>
-              <a:t>This module provides students fundamental knowledge of cybersecurity. It is broken into two micro modules: computer security overview, identification authentication and access control. Computer security overview lists basic terminologies of cyber security. Identification and authentication are discussed with an emphasis on different authentication methods. Access control methods are introduced as well. </a:t>
-            </a:r>
-            <a:endParaRPr lang="en-US" sz="2400" dirty="0" smtClean="0"/>
-          </a:p>
-          <a:p>
-            <a:r>
-              <a:rPr lang="en-US" dirty="0" smtClean="0"/>
-              <a:t>Topics</a:t>
-            </a:r>
-            <a:r>
-              <a:rPr lang="en-US" dirty="0" smtClean="0"/>
-              <a:t>:</a:t>
-            </a:r>
-          </a:p>
-          <a:p>
-            <a:pPr lvl="1"/>
-            <a:r>
-              <a:rPr lang="en-US" dirty="0" smtClean="0"/>
-              <a:t>Lesson 1: Computer security overview</a:t>
-            </a:r>
-          </a:p>
-          <a:p>
-            <a:pPr lvl="1"/>
-            <a:r>
-              <a:rPr lang="en-US" dirty="0" smtClean="0"/>
-              <a:t>Lesson 2: Identification, Authentication, and Access Control </a:t>
-            </a:r>
+            <a:pPr lvl="0"/>
+            <a:r>
+              <a:rPr lang="en-US" sz="2000" dirty="0"/>
+              <a:t>Students will be able to describe the common web attacks, such as cross-site scripting attack, SQL injection attack.</a:t>
+            </a:r>
+          </a:p>
+          <a:p>
+            <a:pPr lvl="0"/>
+            <a:r>
+              <a:rPr lang="en-US" sz="2000" dirty="0"/>
+              <a:t>Students will be able to understand the issues related to general purpose operating systems for security and dependability and the basics of systems hardening.</a:t>
+            </a:r>
+          </a:p>
+          <a:p>
+            <a:pPr lvl="0"/>
+            <a:r>
+              <a:rPr lang="en-US" sz="2000" dirty="0"/>
+              <a:t>Students will be able to list common network security attacks and explain their mitigations.</a:t>
+            </a:r>
+          </a:p>
+          <a:p>
+            <a:pPr lvl="0"/>
+            <a:r>
+              <a:rPr lang="en-US" sz="2000" dirty="0"/>
+              <a:t>Students will be able to discuss basic concepts of firewalls, IDS, and IPS.</a:t>
+            </a:r>
+          </a:p>
+          <a:p>
+            <a:pPr lvl="0"/>
+            <a:r>
+              <a:rPr lang="en-US" sz="2000" dirty="0"/>
+              <a:t>Students will be able to describe legal and ethical issues in cyber security.</a:t>
+            </a:r>
+          </a:p>
+          <a:p>
+            <a:pPr lvl="0"/>
+            <a:r>
+              <a:rPr lang="en-US" sz="2000" dirty="0"/>
+              <a:t>Students will be able to explain issues related to secure system administration, such as system management, maintenance, patching and upgrading.</a:t>
+            </a:r>
+          </a:p>
+          <a:p>
+            <a:pPr lvl="0"/>
+            <a:r>
+              <a:rPr lang="en-US" sz="2000" dirty="0"/>
+              <a:t>Students will be able to understand security policies and compliance issues related to the implementation of security within organizations.</a:t>
+            </a:r>
+          </a:p>
+          <a:p>
+            <a:endParaRPr lang="en-US" sz="2400" dirty="0"/>
           </a:p>
         </p:txBody>
       </p:sp>
     </p:spTree>
     <p:extLst>
       <p:ext uri="{BB962C8B-B14F-4D97-AF65-F5344CB8AC3E}">
-        <p14:creationId xmlns:p14="http://schemas.microsoft.com/office/powerpoint/2010/main" val="389356536"/>
+        <p14:creationId xmlns:p14="http://schemas.microsoft.com/office/powerpoint/2010/main" val="2042592716"/>
       </p:ext>
     </p:extLst>
   </p:cSld>
@@ -6073,7 +6275,7 @@
           <a:p>
             <a:r>
               <a:rPr lang="en-US" smtClean="0"/>
-              <a:t>Lesson 1: Computer security overview</a:t>
+              <a:t>Module 1: Introduction to Cyber Security Concepts</a:t>
             </a:r>
             <a:endParaRPr lang="en-US" dirty="0"/>
           </a:p>
@@ -6095,6 +6297,13 @@
           <a:lstStyle/>
           <a:p>
             <a:r>
+              <a:rPr lang="en-US" sz="2400" dirty="0"/>
+              <a:t>This module provides students fundamental knowledge of cybersecurity. It is broken into two micro modules: computer security overview, identification authentication and access control. Computer security overview lists basic terminologies of cyber security. Identification and authentication are discussed with an emphasis on different authentication methods. Access control methods are introduced as well. </a:t>
+            </a:r>
+            <a:endParaRPr lang="en-US" sz="2400" dirty="0" smtClean="0"/>
+          </a:p>
+          <a:p>
+            <a:r>
               <a:rPr lang="en-US" dirty="0" smtClean="0"/>
               <a:t>Topics:</a:t>
             </a:r>
@@ -6103,68 +6312,22 @@
             <a:pPr lvl="1"/>
             <a:r>
               <a:rPr lang="en-US" dirty="0" smtClean="0"/>
-              <a:t>Computer system and computer security</a:t>
+              <a:t>Lesson 1: Computer security overview</a:t>
             </a:r>
           </a:p>
           <a:p>
             <a:pPr lvl="1"/>
             <a:r>
               <a:rPr lang="en-US" dirty="0" smtClean="0"/>
-              <a:t>Vulnerability, threat, risk, attack.</a:t>
-            </a:r>
-          </a:p>
-          <a:p>
-            <a:pPr lvl="1"/>
-            <a:r>
-              <a:rPr lang="en-US" dirty="0" smtClean="0"/>
-              <a:t>Control, countermeasure.</a:t>
-            </a:r>
-          </a:p>
-          <a:p>
-            <a:r>
-              <a:rPr lang="en-US" dirty="0" smtClean="0"/>
-              <a:t>Learning Outcomes:</a:t>
-            </a:r>
-          </a:p>
-          <a:p>
-            <a:pPr marL="0" indent="0">
-              <a:buNone/>
-            </a:pPr>
-            <a:r>
-              <a:rPr lang="en-US" dirty="0" smtClean="0"/>
-              <a:t>  Upon completion of this lesson:</a:t>
-            </a:r>
-          </a:p>
-          <a:p>
-            <a:pPr lvl="1"/>
-            <a:r>
-              <a:rPr lang="en-US" dirty="0" smtClean="0"/>
-              <a:t>Students will be able to understand the concepts of </a:t>
-            </a:r>
-          </a:p>
-          <a:p>
-            <a:pPr lvl="1"/>
-            <a:r>
-              <a:rPr lang="en-US" dirty="0" smtClean="0"/>
-              <a:t>Students will be able to describe the CIA triad. </a:t>
-            </a:r>
-          </a:p>
-          <a:p>
-            <a:pPr lvl="1"/>
-            <a:r>
-              <a:rPr lang="en-US" dirty="0" smtClean="0"/>
-              <a:t>Students will be able to distinguish between vulnerability, threat, risk and attack. </a:t>
-            </a:r>
-          </a:p>
-          <a:p>
-            <a:endParaRPr lang="en-US" dirty="0"/>
+              <a:t>Lesson 2: Identification, Authentication, and Access Control </a:t>
+            </a:r>
           </a:p>
         </p:txBody>
       </p:sp>
     </p:spTree>
     <p:extLst>
       <p:ext uri="{BB962C8B-B14F-4D97-AF65-F5344CB8AC3E}">
-        <p14:creationId xmlns:p14="http://schemas.microsoft.com/office/powerpoint/2010/main" val="2140105141"/>
+        <p14:creationId xmlns:p14="http://schemas.microsoft.com/office/powerpoint/2010/main" val="389356536"/>
       </p:ext>
     </p:extLst>
   </p:cSld>
@@ -6207,8 +6370,8 @@
           <a:lstStyle/>
           <a:p>
             <a:r>
-              <a:rPr lang="en-US" dirty="0" smtClean="0"/>
-              <a:t>Warm up</a:t>
+              <a:rPr lang="en-US" smtClean="0"/>
+              <a:t>Lesson 1: Computer security overview</a:t>
             </a:r>
             <a:endParaRPr lang="en-US" dirty="0"/>
           </a:p>
@@ -6231,26 +6394,67 @@
           <a:p>
             <a:r>
               <a:rPr lang="en-US" dirty="0" smtClean="0"/>
-              <a:t>Self-introduction</a:t>
-            </a:r>
-          </a:p>
-          <a:p>
-            <a:r>
-              <a:rPr lang="en-US" dirty="0"/>
-              <a:t>Some </a:t>
-            </a:r>
+              <a:t>Topics:</a:t>
+            </a:r>
+          </a:p>
+          <a:p>
+            <a:pPr lvl="1"/>
             <a:r>
               <a:rPr lang="en-US" dirty="0" smtClean="0"/>
-              <a:t>examples of recent </a:t>
-            </a:r>
-            <a:r>
-              <a:rPr lang="en-US" dirty="0"/>
-              <a:t>real-world malicious </a:t>
-            </a:r>
+              <a:t>Computer system and computer security</a:t>
+            </a:r>
+          </a:p>
+          <a:p>
+            <a:pPr lvl="1"/>
             <a:r>
               <a:rPr lang="en-US" dirty="0" smtClean="0"/>
-              <a:t>attacks/security breach?</a:t>
-            </a:r>
+              <a:t>Vulnerability, threat, risk, attack.</a:t>
+            </a:r>
+          </a:p>
+          <a:p>
+            <a:pPr lvl="1"/>
+            <a:r>
+              <a:rPr lang="en-US" dirty="0" smtClean="0"/>
+              <a:t>Control, countermeasure.</a:t>
+            </a:r>
+          </a:p>
+          <a:p>
+            <a:r>
+              <a:rPr lang="en-US" dirty="0" smtClean="0"/>
+              <a:t>Learning Outcomes:</a:t>
+            </a:r>
+          </a:p>
+          <a:p>
+            <a:pPr marL="0" indent="0">
+              <a:buNone/>
+            </a:pPr>
+            <a:r>
+              <a:rPr lang="en-US" dirty="0" smtClean="0"/>
+              <a:t>  Upon completion of this lesson:</a:t>
+            </a:r>
+          </a:p>
+          <a:p>
+            <a:pPr lvl="1"/>
+            <a:r>
+              <a:rPr lang="en-US" dirty="0" smtClean="0"/>
+              <a:t>Students will be able to understand the concepts of cybersecurity.</a:t>
+            </a:r>
+          </a:p>
+          <a:p>
+            <a:pPr lvl="1"/>
+            <a:r>
+              <a:rPr lang="en-US" dirty="0" smtClean="0"/>
+              <a:t>Students will be able to describe the CIA triad. </a:t>
+            </a:r>
+          </a:p>
+          <a:p>
+            <a:pPr lvl="1"/>
+            <a:r>
+              <a:rPr lang="en-US" dirty="0" smtClean="0"/>
+              <a:t>Students will be able to distinguish between vulnerability, threat, risk and attack. </a:t>
+            </a:r>
+          </a:p>
+          <a:p>
             <a:endParaRPr lang="en-US" dirty="0"/>
           </a:p>
         </p:txBody>
@@ -6258,7 +6462,7 @@
     </p:spTree>
     <p:extLst>
       <p:ext uri="{BB962C8B-B14F-4D97-AF65-F5344CB8AC3E}">
-        <p14:creationId xmlns:p14="http://schemas.microsoft.com/office/powerpoint/2010/main" val="2018550906"/>
+        <p14:creationId xmlns:p14="http://schemas.microsoft.com/office/powerpoint/2010/main" val="2140105141"/>
       </p:ext>
     </p:extLst>
   </p:cSld>
@@ -6287,13 +6491,7 @@
       </p:grpSpPr>
       <p:sp>
         <p:nvSpPr>
-          <p:cNvPr id="2" name="Title 1">
-            <a:extLst>
-              <a:ext uri="{FF2B5EF4-FFF2-40B4-BE49-F238E27FC236}">
-                <a16:creationId xmlns="" xmlns:a16="http://schemas.microsoft.com/office/drawing/2014/main" id="{0A12855B-C930-4C9E-A5D0-A0000ADDA05B}"/>
-              </a:ext>
-            </a:extLst>
-          </p:cNvPr>
+          <p:cNvPr id="2" name="Title 1"/>
           <p:cNvSpPr>
             <a:spLocks noGrp="1"/>
           </p:cNvSpPr>
@@ -6307,8 +6505,8 @@
           <a:lstStyle/>
           <a:p>
             <a:r>
-              <a:rPr lang="en-US" smtClean="0"/>
-              <a:t>What is Computer Security?</a:t>
+              <a:rPr lang="en-US" dirty="0" smtClean="0"/>
+              <a:t>Warm up</a:t>
             </a:r>
             <a:endParaRPr lang="en-US" dirty="0"/>
           </a:p>
@@ -6316,13 +6514,7 @@
       </p:sp>
       <p:sp>
         <p:nvSpPr>
-          <p:cNvPr id="3" name="Content Placeholder 2">
-            <a:extLst>
-              <a:ext uri="{FF2B5EF4-FFF2-40B4-BE49-F238E27FC236}">
-                <a16:creationId xmlns="" xmlns:a16="http://schemas.microsoft.com/office/drawing/2014/main" id="{0886927F-048C-4E02-A5BC-A23D7A9481D6}"/>
-              </a:ext>
-            </a:extLst>
-          </p:cNvPr>
+          <p:cNvPr id="3" name="Content Placeholder 2"/>
           <p:cNvSpPr>
             <a:spLocks noGrp="1"/>
           </p:cNvSpPr>
@@ -6336,20 +6528,27 @@
           <a:lstStyle/>
           <a:p>
             <a:r>
-              <a:rPr lang="en-US" smtClean="0"/>
-              <a:t>Computer security: Measures and controls that ensure confidentiality, integrity, and availability of information system assets including hardware, software, firmware, and information being processed, stored, and communicated. </a:t>
-            </a:r>
-          </a:p>
-          <a:p>
-            <a:endParaRPr lang="en-US" smtClean="0"/>
-          </a:p>
-          <a:p>
-            <a:r>
-              <a:rPr lang="en-US" smtClean="0"/>
-              <a:t>Information system: Hardware, software, and data.</a:t>
-            </a:r>
-          </a:p>
-          <a:p>
+              <a:rPr lang="en-US" dirty="0" smtClean="0"/>
+              <a:t>Self-introduction</a:t>
+            </a:r>
+          </a:p>
+          <a:p>
+            <a:r>
+              <a:rPr lang="en-US" dirty="0"/>
+              <a:t>Some </a:t>
+            </a:r>
+            <a:r>
+              <a:rPr lang="en-US" dirty="0" smtClean="0"/>
+              <a:t>examples of recent </a:t>
+            </a:r>
+            <a:r>
+              <a:rPr lang="en-US" dirty="0"/>
+              <a:t>real-world malicious </a:t>
+            </a:r>
+            <a:r>
+              <a:rPr lang="en-US" dirty="0" smtClean="0"/>
+              <a:t>attacks/security breach?</a:t>
+            </a:r>
             <a:endParaRPr lang="en-US" dirty="0"/>
           </a:p>
         </p:txBody>
@@ -6357,7 +6556,7 @@
     </p:spTree>
     <p:extLst>
       <p:ext uri="{BB962C8B-B14F-4D97-AF65-F5344CB8AC3E}">
-        <p14:creationId xmlns:p14="http://schemas.microsoft.com/office/powerpoint/2010/main" val="1501423933"/>
+        <p14:creationId xmlns:p14="http://schemas.microsoft.com/office/powerpoint/2010/main" val="2018550906"/>
       </p:ext>
     </p:extLst>
   </p:cSld>
@@ -6389,7 +6588,7 @@
           <p:cNvPr id="2" name="Title 1">
             <a:extLst>
               <a:ext uri="{FF2B5EF4-FFF2-40B4-BE49-F238E27FC236}">
-                <a16:creationId xmlns="" xmlns:a16="http://schemas.microsoft.com/office/drawing/2014/main" id="{C7041EED-8CB5-4D49-8946-45839D580999}"/>
+                <a16:creationId xmlns:a16="http://schemas.microsoft.com/office/drawing/2014/main" xmlns="" id="{0A12855B-C930-4C9E-A5D0-A0000ADDA05B}"/>
               </a:ext>
             </a:extLst>
           </p:cNvPr>
@@ -6407,7 +6606,7 @@
           <a:p>
             <a:r>
               <a:rPr lang="en-US" smtClean="0"/>
-              <a:t>Assets of Information systems</a:t>
+              <a:t>What is Computer Security?</a:t>
             </a:r>
             <a:endParaRPr lang="en-US" dirty="0"/>
           </a:p>
@@ -6415,7 +6614,13 @@
       </p:sp>
       <p:sp>
         <p:nvSpPr>
-          <p:cNvPr id="8" name="Content Placeholder 7"/>
+          <p:cNvPr id="3" name="Content Placeholder 2">
+            <a:extLst>
+              <a:ext uri="{FF2B5EF4-FFF2-40B4-BE49-F238E27FC236}">
+                <a16:creationId xmlns:a16="http://schemas.microsoft.com/office/drawing/2014/main" xmlns="" id="{0886927F-048C-4E02-A5BC-A23D7A9481D6}"/>
+              </a:ext>
+            </a:extLst>
+          </p:cNvPr>
           <p:cNvSpPr>
             <a:spLocks noGrp="1"/>
           </p:cNvSpPr>
@@ -6423,85 +6628,24 @@
             <p:ph idx="1"/>
           </p:nvPr>
         </p:nvSpPr>
-        <p:spPr>
-          <a:xfrm>
-            <a:off x="628650" y="1377863"/>
-            <a:ext cx="7587095" cy="4799100"/>
-          </a:xfrm>
-        </p:spPr>
+        <p:spPr/>
         <p:txBody>
           <a:bodyPr/>
           <a:lstStyle/>
           <a:p>
             <a:r>
-              <a:rPr lang="en-US" dirty="0" smtClean="0"/>
-              <a:t>Information system:</a:t>
-            </a:r>
-          </a:p>
-          <a:p>
-            <a:r>
-              <a:rPr lang="en-US" dirty="0" smtClean="0"/>
-              <a:t>Hardware</a:t>
-            </a:r>
-            <a:r>
-              <a:rPr lang="en-US" dirty="0"/>
-              <a:t>:</a:t>
-            </a:r>
-          </a:p>
-          <a:p>
-            <a:pPr lvl="1"/>
-            <a:r>
-              <a:rPr lang="en-US" dirty="0" smtClean="0"/>
-              <a:t>Computer, Network gear, Hard drives, Memory, CDROM</a:t>
-            </a:r>
-            <a:r>
-              <a:rPr lang="mr-IN" dirty="0" smtClean="0"/>
-              <a:t>…</a:t>
-            </a:r>
-            <a:endParaRPr lang="en-US" dirty="0"/>
-          </a:p>
-          <a:p>
-            <a:r>
-              <a:rPr lang="en-US" dirty="0"/>
-              <a:t>Software:</a:t>
-            </a:r>
-          </a:p>
-          <a:p>
-            <a:pPr lvl="1"/>
-            <a:r>
-              <a:rPr lang="en-US" dirty="0"/>
-              <a:t>Operating </a:t>
-            </a:r>
-            <a:r>
-              <a:rPr lang="en-US" dirty="0" smtClean="0"/>
-              <a:t>system, Web browser, Text editor, Music player, pdf reader</a:t>
-            </a:r>
-            <a:r>
-              <a:rPr lang="mr-IN" dirty="0" smtClean="0"/>
-              <a:t>…</a:t>
-            </a:r>
-            <a:endParaRPr lang="en-US" dirty="0" smtClean="0"/>
-          </a:p>
-          <a:p>
-            <a:r>
-              <a:rPr lang="en-US" dirty="0"/>
-              <a:t>Data:</a:t>
-            </a:r>
-          </a:p>
-          <a:p>
-            <a:pPr lvl="1"/>
-            <a:r>
-              <a:rPr lang="en-US" dirty="0" smtClean="0"/>
-              <a:t>Documents, Photos, Emails, Music, Videos</a:t>
-            </a:r>
-            <a:r>
-              <a:rPr lang="mr-IN" dirty="0" smtClean="0"/>
-              <a:t>…</a:t>
-            </a:r>
-            <a:endParaRPr lang="en-US" dirty="0"/>
-          </a:p>
-          <a:p>
-            <a:endParaRPr lang="en-US" dirty="0"/>
+              <a:rPr lang="en-US" smtClean="0"/>
+              <a:t>Computer security: Measures and controls that ensure confidentiality, integrity, and availability of information system assets including hardware, software, firmware, and information being processed, stored, and communicated. </a:t>
+            </a:r>
+          </a:p>
+          <a:p>
+            <a:endParaRPr lang="en-US" smtClean="0"/>
+          </a:p>
+          <a:p>
+            <a:r>
+              <a:rPr lang="en-US" smtClean="0"/>
+              <a:t>Information system: Hardware, software, and data.</a:t>
+            </a:r>
           </a:p>
           <a:p>
             <a:endParaRPr lang="en-US" dirty="0"/>
@@ -6511,7 +6655,7 @@
     </p:spTree>
     <p:extLst>
       <p:ext uri="{BB962C8B-B14F-4D97-AF65-F5344CB8AC3E}">
-        <p14:creationId xmlns:p14="http://schemas.microsoft.com/office/powerpoint/2010/main" val="1499189681"/>
+        <p14:creationId xmlns:p14="http://schemas.microsoft.com/office/powerpoint/2010/main" val="1501423933"/>
       </p:ext>
     </p:extLst>
   </p:cSld>

</xml_diff>